<commit_message>
Weather api + header consistent code
</commit_message>
<xml_diff>
--- a/What is google analytics_SEO.pptx
+++ b/What is google analytics_SEO.pptx
@@ -8,19 +8,18 @@
     <p:sldMasterId id="2147483724" r:id="rId4"/>
   </p:sldMasterIdLst>
   <p:notesMasterIdLst>
-    <p:notesMasterId r:id="rId12"/>
+    <p:notesMasterId r:id="rId11"/>
   </p:notesMasterIdLst>
   <p:handoutMasterIdLst>
-    <p:handoutMasterId r:id="rId13"/>
+    <p:handoutMasterId r:id="rId12"/>
   </p:handoutMasterIdLst>
   <p:sldIdLst>
     <p:sldId id="446" r:id="rId5"/>
     <p:sldId id="453" r:id="rId6"/>
     <p:sldId id="447" r:id="rId7"/>
-    <p:sldId id="426" r:id="rId8"/>
-    <p:sldId id="456" r:id="rId9"/>
-    <p:sldId id="454" r:id="rId10"/>
-    <p:sldId id="455" r:id="rId11"/>
+    <p:sldId id="457" r:id="rId8"/>
+    <p:sldId id="426" r:id="rId9"/>
+    <p:sldId id="456" r:id="rId10"/>
   </p:sldIdLst>
   <p:sldSz cx="12192000" cy="6858000"/>
   <p:notesSz cx="6858000" cy="9144000"/>
@@ -182,8 +181,87 @@
 </p188:authorLst>
 </file>
 
+<file path=ppt/revisionInfo.xml><?xml version="1.0" encoding="utf-8"?>
+<p1510:revInfo xmlns:a="http://schemas.openxmlformats.org/drawingml/2006/main" xmlns:r="http://schemas.openxmlformats.org/officeDocument/2006/relationships" xmlns:p1510="http://schemas.microsoft.com/office/powerpoint/2015/10/main">
+  <p1510:revLst>
+    <p1510:client id="{C65E6FC3-F676-49BE-9B65-0AE2EFE6AD8D}" v="10" dt="2022-03-10T09:30:35.715"/>
+    <p1510:client id="{FAF7C78A-0DAD-4E5B-AB6C-36DB700BF00F}" v="7" dt="2022-03-10T09:26:55.889"/>
+  </p1510:revLst>
+</p1510:revInfo>
+</file>
+
 <file path=ppt/changesInfos/changesInfo1.xml><?xml version="1.0" encoding="utf-8"?>
 <pc:chgInfo xmlns:a="http://schemas.openxmlformats.org/drawingml/2006/main" xmlns:r="http://schemas.openxmlformats.org/officeDocument/2006/relationships" xmlns:ac="http://schemas.microsoft.com/office/drawing/2013/main/command" xmlns:pc="http://schemas.microsoft.com/office/powerpoint/2013/main/command">
+  <pc:docChgLst>
+    <pc:chgData name="Jason McLaughlin" userId="89f1bd63fffebd77" providerId="Windows Live" clId="Web-{C65E6FC3-F676-49BE-9B65-0AE2EFE6AD8D}"/>
+    <pc:docChg chg="delSld modSld">
+      <pc:chgData name="Jason McLaughlin" userId="89f1bd63fffebd77" providerId="Windows Live" clId="Web-{C65E6FC3-F676-49BE-9B65-0AE2EFE6AD8D}" dt="2022-03-10T09:30:35.715" v="11" actId="20577"/>
+      <pc:docMkLst>
+        <pc:docMk/>
+      </pc:docMkLst>
+      <pc:sldChg chg="modSp">
+        <pc:chgData name="Jason McLaughlin" userId="89f1bd63fffebd77" providerId="Windows Live" clId="Web-{C65E6FC3-F676-49BE-9B65-0AE2EFE6AD8D}" dt="2022-03-10T09:30:35.715" v="11" actId="20577"/>
+        <pc:sldMkLst>
+          <pc:docMk/>
+          <pc:sldMk cId="1558315191" sldId="446"/>
+        </pc:sldMkLst>
+        <pc:spChg chg="mod">
+          <ac:chgData name="Jason McLaughlin" userId="89f1bd63fffebd77" providerId="Windows Live" clId="Web-{C65E6FC3-F676-49BE-9B65-0AE2EFE6AD8D}" dt="2022-03-10T09:30:35.715" v="11" actId="20577"/>
+          <ac:spMkLst>
+            <pc:docMk/>
+            <pc:sldMk cId="1558315191" sldId="446"/>
+            <ac:spMk id="4" creationId="{08347D8D-E852-43D5-858E-2D01BE57FA93}"/>
+          </ac:spMkLst>
+        </pc:spChg>
+      </pc:sldChg>
+      <pc:sldChg chg="del">
+        <pc:chgData name="Jason McLaughlin" userId="89f1bd63fffebd77" providerId="Windows Live" clId="Web-{C65E6FC3-F676-49BE-9B65-0AE2EFE6AD8D}" dt="2022-03-10T09:27:51.836" v="0"/>
+        <pc:sldMkLst>
+          <pc:docMk/>
+          <pc:sldMk cId="122353823" sldId="454"/>
+        </pc:sldMkLst>
+      </pc:sldChg>
+      <pc:sldChg chg="del">
+        <pc:chgData name="Jason McLaughlin" userId="89f1bd63fffebd77" providerId="Windows Live" clId="Web-{C65E6FC3-F676-49BE-9B65-0AE2EFE6AD8D}" dt="2022-03-10T09:27:58.508" v="1"/>
+        <pc:sldMkLst>
+          <pc:docMk/>
+          <pc:sldMk cId="866616894" sldId="455"/>
+        </pc:sldMkLst>
+      </pc:sldChg>
+    </pc:docChg>
+  </pc:docChgLst>
+  <pc:docChgLst>
+    <pc:chgData name="Jason McLaughlin" userId="89f1bd63fffebd77" providerId="Windows Live" clId="Web-{FAF7C78A-0DAD-4E5B-AB6C-36DB700BF00F}"/>
+    <pc:docChg chg="addSld modSld">
+      <pc:chgData name="Jason McLaughlin" userId="89f1bd63fffebd77" providerId="Windows Live" clId="Web-{FAF7C78A-0DAD-4E5B-AB6C-36DB700BF00F}" dt="2022-03-10T09:26:53.764" v="5" actId="20577"/>
+      <pc:docMkLst>
+        <pc:docMk/>
+      </pc:docMkLst>
+      <pc:sldChg chg="modSp add replId">
+        <pc:chgData name="Jason McLaughlin" userId="89f1bd63fffebd77" providerId="Windows Live" clId="Web-{FAF7C78A-0DAD-4E5B-AB6C-36DB700BF00F}" dt="2022-03-10T09:26:53.764" v="5" actId="20577"/>
+        <pc:sldMkLst>
+          <pc:docMk/>
+          <pc:sldMk cId="7168050" sldId="457"/>
+        </pc:sldMkLst>
+        <pc:spChg chg="mod">
+          <ac:chgData name="Jason McLaughlin" userId="89f1bd63fffebd77" providerId="Windows Live" clId="Web-{FAF7C78A-0DAD-4E5B-AB6C-36DB700BF00F}" dt="2022-03-10T09:26:53.764" v="5" actId="20577"/>
+          <ac:spMkLst>
+            <pc:docMk/>
+            <pc:sldMk cId="7168050" sldId="457"/>
+            <ac:spMk id="4" creationId="{135A981B-6487-4B00-9EAF-D0D748FA6014}"/>
+          </ac:spMkLst>
+        </pc:spChg>
+        <pc:spChg chg="mod">
+          <ac:chgData name="Jason McLaughlin" userId="89f1bd63fffebd77" providerId="Windows Live" clId="Web-{FAF7C78A-0DAD-4E5B-AB6C-36DB700BF00F}" dt="2022-03-10T09:26:44.701" v="2" actId="20577"/>
+          <ac:spMkLst>
+            <pc:docMk/>
+            <pc:sldMk cId="7168050" sldId="457"/>
+            <ac:spMk id="6" creationId="{B43F7E3B-CE99-4770-8587-6554C15693F8}"/>
+          </ac:spMkLst>
+        </pc:spChg>
+      </pc:sldChg>
+    </pc:docChg>
+  </pc:docChgLst>
   <pc:docChgLst>
     <pc:chgData name="Jason McLaughlin" userId="89f1bd63fffebd77" providerId="LiveId" clId="{F00BE73F-F4A1-47E1-B050-8D02D04B5B32}"/>
     <pc:docChg chg="custSel addSld modSld">
@@ -382,7 +460,7 @@
           <a:p>
             <a:fld id="{E54A69E4-EFBB-4687-8058-A94EE1B5781B}" type="datetimeFigureOut">
               <a:rPr lang="en-US" smtClean="0"/>
-              <a:t>3/7/2022</a:t>
+              <a:t>3/10/2022</a:t>
             </a:fld>
             <a:endParaRPr lang="en-US" dirty="0"/>
           </a:p>
@@ -559,7 +637,7 @@
           <a:p>
             <a:fld id="{CDE546B2-EB9C-4E9C-8793-C25F32D58B9A}" type="datetimeFigureOut">
               <a:rPr lang="en-US" smtClean="0"/>
-              <a:t>3/7/2022</a:t>
+              <a:t>3/10/2022</a:t>
             </a:fld>
             <a:endParaRPr lang="en-US" dirty="0"/>
           </a:p>
@@ -1078,6 +1156,90 @@
 </p:notes>
 </file>
 
+<file path=ppt/notesSlides/notesSlide4.xml><?xml version="1.0" encoding="utf-8"?>
+<p:notes xmlns:a="http://schemas.openxmlformats.org/drawingml/2006/main" xmlns:r="http://schemas.openxmlformats.org/officeDocument/2006/relationships" xmlns:p="http://schemas.openxmlformats.org/presentationml/2006/main">
+  <p:cSld>
+    <p:spTree>
+      <p:nvGrpSpPr>
+        <p:cNvPr id="1" name=""/>
+        <p:cNvGrpSpPr/>
+        <p:nvPr/>
+      </p:nvGrpSpPr>
+      <p:grpSpPr>
+        <a:xfrm>
+          <a:off x="0" y="0"/>
+          <a:ext cx="0" cy="0"/>
+          <a:chOff x="0" y="0"/>
+          <a:chExt cx="0" cy="0"/>
+        </a:xfrm>
+      </p:grpSpPr>
+      <p:sp>
+        <p:nvSpPr>
+          <p:cNvPr id="2" name="Slide Image Placeholder 1"/>
+          <p:cNvSpPr>
+            <a:spLocks noGrp="1" noRot="1" noChangeAspect="1"/>
+          </p:cNvSpPr>
+          <p:nvPr>
+            <p:ph type="sldImg"/>
+          </p:nvPr>
+        </p:nvSpPr>
+        <p:spPr/>
+      </p:sp>
+      <p:sp>
+        <p:nvSpPr>
+          <p:cNvPr id="3" name="Notes Placeholder 2"/>
+          <p:cNvSpPr>
+            <a:spLocks noGrp="1"/>
+          </p:cNvSpPr>
+          <p:nvPr>
+            <p:ph type="body" idx="1"/>
+          </p:nvPr>
+        </p:nvSpPr>
+        <p:spPr/>
+        <p:txBody>
+          <a:bodyPr/>
+          <a:lstStyle/>
+          <a:p>
+            <a:endParaRPr lang="en-US" dirty="0"/>
+          </a:p>
+        </p:txBody>
+      </p:sp>
+      <p:sp>
+        <p:nvSpPr>
+          <p:cNvPr id="4" name="Slide Number Placeholder 3"/>
+          <p:cNvSpPr>
+            <a:spLocks noGrp="1"/>
+          </p:cNvSpPr>
+          <p:nvPr>
+            <p:ph type="sldNum" sz="quarter" idx="5"/>
+          </p:nvPr>
+        </p:nvSpPr>
+        <p:spPr/>
+        <p:txBody>
+          <a:bodyPr/>
+          <a:lstStyle/>
+          <a:p>
+            <a:fld id="{6B83F1C3-4FA3-4491-97F4-43CA9C8BDFDF}" type="slidenum">
+              <a:rPr lang="en-US" smtClean="0"/>
+              <a:t>4</a:t>
+            </a:fld>
+            <a:endParaRPr lang="en-US" dirty="0"/>
+          </a:p>
+        </p:txBody>
+      </p:sp>
+    </p:spTree>
+    <p:extLst>
+      <p:ext uri="{BB962C8B-B14F-4D97-AF65-F5344CB8AC3E}">
+        <p14:creationId xmlns:p14="http://schemas.microsoft.com/office/powerpoint/2010/main" val="1753445869"/>
+      </p:ext>
+    </p:extLst>
+  </p:cSld>
+  <p:clrMapOvr>
+    <a:masterClrMapping/>
+  </p:clrMapOvr>
+</p:notes>
+</file>
+
 <file path=ppt/slideLayouts/slideLayout1.xml><?xml version="1.0" encoding="utf-8"?>
 <p:sldLayout xmlns:a="http://schemas.openxmlformats.org/drawingml/2006/main" xmlns:r="http://schemas.openxmlformats.org/officeDocument/2006/relationships" xmlns:p="http://schemas.openxmlformats.org/presentationml/2006/main" preserve="1" userDrawn="1">
   <p:cSld name="Title">
@@ -5055,7 +5217,7 @@
           <a:p>
             <a:fld id="{8F310904-DE8F-4B8E-99C6-5AFA03672FFA}" type="datetimeFigureOut">
               <a:rPr lang="en-US" smtClean="0"/>
-              <a:t>3/7/2022</a:t>
+              <a:t>3/10/2022</a:t>
             </a:fld>
             <a:endParaRPr lang="en-US" dirty="0"/>
           </a:p>
@@ -5586,7 +5748,7 @@
           <a:p>
             <a:fld id="{8F310904-DE8F-4B8E-99C6-5AFA03672FFA}" type="datetimeFigureOut">
               <a:rPr lang="en-US" smtClean="0"/>
-              <a:t>3/7/2022</a:t>
+              <a:t>3/10/2022</a:t>
             </a:fld>
             <a:endParaRPr lang="en-US" dirty="0"/>
           </a:p>
@@ -6114,7 +6276,7 @@
           <a:p>
             <a:fld id="{8F310904-DE8F-4B8E-99C6-5AFA03672FFA}" type="datetimeFigureOut">
               <a:rPr lang="en-US" smtClean="0"/>
-              <a:t>3/7/2022</a:t>
+              <a:t>3/10/2022</a:t>
             </a:fld>
             <a:endParaRPr lang="en-US" dirty="0"/>
           </a:p>
@@ -6642,7 +6804,7 @@
           <a:p>
             <a:fld id="{8F310904-DE8F-4B8E-99C6-5AFA03672FFA}" type="datetimeFigureOut">
               <a:rPr lang="en-US" smtClean="0"/>
-              <a:t>3/7/2022</a:t>
+              <a:t>3/10/2022</a:t>
             </a:fld>
             <a:endParaRPr lang="en-US" dirty="0"/>
           </a:p>
@@ -7155,13 +7317,7 @@
                 <a:solidFill>
                   <a:schemeClr val="tx1"/>
                 </a:solidFill>
-              </a:rPr>
-            </a:br>
-            <a:br>
-              <a:rPr lang="en-US" b="1" dirty="0">
-                <a:solidFill>
-                  <a:schemeClr val="tx1"/>
-                </a:solidFill>
+                <a:cs typeface="Segoe UI Light"/>
               </a:rPr>
             </a:br>
             <a:r>
@@ -7169,8 +7325,9 @@
                 <a:solidFill>
                   <a:schemeClr val="tx1"/>
                 </a:solidFill>
+                <a:cs typeface="Segoe UI Light"/>
               </a:rPr>
-              <a:t>* Free service by Google</a:t>
+              <a:t>By Jason McLaughlin</a:t>
             </a:r>
             <a:br>
               <a:rPr lang="en-US" b="1" dirty="0">
@@ -7179,8 +7336,22 @@
                 </a:solidFill>
               </a:rPr>
             </a:br>
+            <a:br>
+              <a:rPr lang="en-US" b="1" dirty="0"/>
+            </a:br>
             <a:r>
-              <a:rPr lang="en-US" b="1" dirty="0">
+              <a:rPr lang="en-US" sz="2800" b="1" dirty="0">
+                <a:solidFill>
+                  <a:schemeClr val="tx1"/>
+                </a:solidFill>
+              </a:rPr>
+              <a:t>* Free service by Google</a:t>
+            </a:r>
+            <a:br>
+              <a:rPr lang="en-US" sz="2800" b="1" dirty="0"/>
+            </a:br>
+            <a:r>
+              <a:rPr lang="en-US" sz="2800" b="1" dirty="0">
                 <a:solidFill>
                   <a:schemeClr val="tx1"/>
                 </a:solidFill>
@@ -7188,14 +7359,10 @@
               <a:t>* Most used website statistics Service</a:t>
             </a:r>
             <a:br>
-              <a:rPr lang="en-US" b="1" dirty="0">
-                <a:solidFill>
-                  <a:schemeClr val="tx1"/>
-                </a:solidFill>
-              </a:rPr>
+              <a:rPr lang="en-US" sz="2800" b="1" dirty="0"/>
             </a:br>
             <a:r>
-              <a:rPr lang="en-US" b="1" dirty="0">
+              <a:rPr lang="en-US" sz="2800" b="1" dirty="0">
                 <a:solidFill>
                   <a:schemeClr val="tx1"/>
                 </a:solidFill>
@@ -7203,14 +7370,10 @@
               <a:t>* Provides statistics about visitor and transactions on a website</a:t>
             </a:r>
             <a:br>
-              <a:rPr lang="en-US" b="1" dirty="0">
-                <a:solidFill>
-                  <a:schemeClr val="tx1"/>
-                </a:solidFill>
-              </a:rPr>
+              <a:rPr lang="en-US" sz="2800" b="1" dirty="0"/>
             </a:br>
             <a:r>
-              <a:rPr lang="en-US" b="1" dirty="0">
+              <a:rPr lang="en-US" sz="2800" b="1" dirty="0">
                 <a:solidFill>
                   <a:schemeClr val="tx1"/>
                 </a:solidFill>
@@ -7573,12 +7736,102 @@
           <a:chExt cx="0" cy="0"/>
         </a:xfrm>
       </p:grpSpPr>
-      <p:sp>
-        <p:nvSpPr>
-          <p:cNvPr id="2" name="Title 1">
-            <a:extLst>
-              <a:ext uri="{FF2B5EF4-FFF2-40B4-BE49-F238E27FC236}">
-                <a16:creationId xmlns:a16="http://schemas.microsoft.com/office/drawing/2014/main" id="{9416A8C9-9EB6-43DA-BD3E-58FAC144BF5C}"/>
+      <p:pic>
+        <p:nvPicPr>
+          <p:cNvPr id="8" name="Picture Placeholder 7" descr="A person standing on a rock while looking at the ocean wave with outstretched arms">
+            <a:extLst>
+              <a:ext uri="{FF2B5EF4-FFF2-40B4-BE49-F238E27FC236}">
+                <a16:creationId xmlns:a16="http://schemas.microsoft.com/office/drawing/2014/main" id="{8C1A64BB-92C4-44CC-9AB7-8416F1B9BF56}"/>
+              </a:ext>
+            </a:extLst>
+          </p:cNvPr>
+          <p:cNvPicPr>
+            <a:picLocks noGrp="1" noChangeAspect="1"/>
+          </p:cNvPicPr>
+          <p:nvPr>
+            <p:ph type="pic" sz="quarter" idx="13"/>
+          </p:nvPr>
+        </p:nvPicPr>
+        <p:blipFill rotWithShape="1">
+          <a:blip r:embed="rId3" cstate="screen">
+            <a:extLst>
+              <a:ext uri="{28A0092B-C50C-407E-A947-70E740481C1C}">
+                <a14:useLocalDpi xmlns:a14="http://schemas.microsoft.com/office/drawing/2010/main"/>
+              </a:ext>
+            </a:extLst>
+          </a:blip>
+          <a:srcRect/>
+          <a:stretch/>
+        </p:blipFill>
+        <p:spPr>
+          <a:xfrm>
+            <a:off x="0" y="0"/>
+            <a:ext cx="12192000" cy="6858000"/>
+          </a:xfrm>
+          <a:solidFill>
+            <a:srgbClr val="6768AB">
+              <a:alpha val="75000"/>
+            </a:srgbClr>
+          </a:solidFill>
+        </p:spPr>
+      </p:pic>
+      <p:sp>
+        <p:nvSpPr>
+          <p:cNvPr id="9" name="Rectangle 8" descr="Shaded overlay">
+            <a:extLst>
+              <a:ext uri="{FF2B5EF4-FFF2-40B4-BE49-F238E27FC236}">
+                <a16:creationId xmlns:a16="http://schemas.microsoft.com/office/drawing/2014/main" id="{558C501A-DC1F-4BA4-BFFA-44EF8845A384}"/>
+              </a:ext>
+            </a:extLst>
+          </p:cNvPr>
+          <p:cNvSpPr/>
+          <p:nvPr/>
+        </p:nvSpPr>
+        <p:spPr>
+          <a:xfrm>
+            <a:off x="257695" y="-83127"/>
+            <a:ext cx="12192000" cy="6858000"/>
+          </a:xfrm>
+          <a:prstGeom prst="rect">
+            <a:avLst/>
+          </a:prstGeom>
+          <a:solidFill>
+            <a:srgbClr val="6768AB">
+              <a:alpha val="74902"/>
+            </a:srgbClr>
+          </a:solidFill>
+        </p:spPr>
+        <p:style>
+          <a:lnRef idx="2">
+            <a:schemeClr val="accent1">
+              <a:shade val="50000"/>
+            </a:schemeClr>
+          </a:lnRef>
+          <a:fillRef idx="1">
+            <a:schemeClr val="accent1"/>
+          </a:fillRef>
+          <a:effectRef idx="0">
+            <a:schemeClr val="accent1"/>
+          </a:effectRef>
+          <a:fontRef idx="minor">
+            <a:schemeClr val="lt1"/>
+          </a:fontRef>
+        </p:style>
+        <p:txBody>
+          <a:bodyPr rtlCol="0" anchor="ctr"/>
+          <a:lstStyle/>
+          <a:p>
+            <a:pPr algn="ctr"/>
+            <a:endParaRPr lang="en-US" dirty="0"/>
+          </a:p>
+        </p:txBody>
+      </p:sp>
+      <p:sp>
+        <p:nvSpPr>
+          <p:cNvPr id="4" name="Title 3">
+            <a:extLst>
+              <a:ext uri="{FF2B5EF4-FFF2-40B4-BE49-F238E27FC236}">
+                <a16:creationId xmlns:a16="http://schemas.microsoft.com/office/drawing/2014/main" id="{135A981B-6487-4B00-9EAF-D0D748FA6014}"/>
               </a:ext>
             </a:extLst>
           </p:cNvPr>
@@ -7592,26 +7845,26 @@
         <p:spPr>
           <a:xfrm>
             <a:off x="457199" y="914400"/>
-            <a:ext cx="5605272" cy="1572126"/>
-          </a:xfrm>
-        </p:spPr>
-        <p:txBody>
-          <a:bodyPr anchor="ctr" anchorCtr="0"/>
+            <a:ext cx="11174819" cy="903767"/>
+          </a:xfrm>
+        </p:spPr>
+        <p:txBody>
+          <a:bodyPr/>
           <a:lstStyle/>
           <a:p>
             <a:r>
               <a:rPr lang="en-US" dirty="0"/>
-              <a:t>What is SOE? </a:t>
+              <a:t>How Does Google Analytics Work?  - Video</a:t>
             </a:r>
           </a:p>
         </p:txBody>
       </p:sp>
       <p:sp>
         <p:nvSpPr>
-          <p:cNvPr id="3" name="Text Placeholder 2">
-            <a:extLst>
-              <a:ext uri="{FF2B5EF4-FFF2-40B4-BE49-F238E27FC236}">
-                <a16:creationId xmlns:a16="http://schemas.microsoft.com/office/drawing/2014/main" id="{50EACE68-C884-4900-BA05-58DEA1511030}"/>
+          <p:cNvPr id="6" name="Text Placeholder 5">
+            <a:extLst>
+              <a:ext uri="{FF2B5EF4-FFF2-40B4-BE49-F238E27FC236}">
+                <a16:creationId xmlns:a16="http://schemas.microsoft.com/office/drawing/2014/main" id="{B43F7E3B-CE99-4770-8587-6554C15693F8}"/>
               </a:ext>
             </a:extLst>
           </p:cNvPr>
@@ -7624,67 +7877,24 @@
         </p:nvSpPr>
         <p:spPr>
           <a:xfrm>
-            <a:off x="457199" y="2701636"/>
-            <a:ext cx="6226233" cy="3241964"/>
-          </a:xfrm>
-        </p:spPr>
-        <p:txBody>
-          <a:bodyPr/>
+            <a:off x="565265" y="2240280"/>
+            <a:ext cx="7508887" cy="4197096"/>
+          </a:xfrm>
+        </p:spPr>
+        <p:txBody>
+          <a:bodyPr lIns="91440" tIns="45720" rIns="91440" bIns="45720" anchor="t"/>
           <a:lstStyle/>
           <a:p>
-            <a:pPr marL="285750" indent="-285750">
-              <a:buFont typeface="Arial" panose="020B0604020202020204" pitchFamily="34" charset="0"/>
-              <a:buChar char="•"/>
-            </a:pPr>
-            <a:r>
-              <a:rPr lang="en-US" sz="2000" dirty="0"/>
-              <a:t>Stands for SEARCH ENGINE OPTIMISATION</a:t>
-            </a:r>
-          </a:p>
-          <a:p>
-            <a:pPr marL="285750" indent="-285750">
-              <a:buFont typeface="Arial" panose="020B0604020202020204" pitchFamily="34" charset="0"/>
-              <a:buChar char="•"/>
-            </a:pPr>
-            <a:r>
-              <a:rPr lang="en-US" sz="2000" dirty="0"/>
-              <a:t>SEO is the process of affecting the visibility of a website or a web page in a web search engine’s </a:t>
-            </a:r>
-            <a:r>
-              <a:rPr lang="en-US" sz="2000" u="sng" dirty="0"/>
-              <a:t>unpaid</a:t>
-            </a:r>
-            <a:r>
-              <a:rPr lang="en-US" sz="2000" dirty="0"/>
-              <a:t> results.</a:t>
-            </a:r>
-          </a:p>
-          <a:p>
-            <a:pPr marL="285750" indent="-285750">
-              <a:buFont typeface="Arial" panose="020B0604020202020204" pitchFamily="34" charset="0"/>
-              <a:buChar char="•"/>
-            </a:pPr>
-            <a:r>
-              <a:rPr lang="en-US" sz="2000" dirty="0"/>
-              <a:t>SEO helps the engines figure out what each page is about, how it is useful to users.</a:t>
-            </a:r>
-          </a:p>
-          <a:p>
-            <a:pPr marL="285750" indent="-285750">
-              <a:buFont typeface="Arial" panose="020B0604020202020204" pitchFamily="34" charset="0"/>
-              <a:buChar char="•"/>
-            </a:pPr>
-            <a:r>
-              <a:rPr lang="en-US" sz="2000" dirty="0"/>
-              <a:t>SEO allows web developers to provide clues that engines use to understand web content.</a:t>
-            </a:r>
+            <a:endParaRPr lang="en-US" dirty="0">
+              <a:cs typeface="Segoe UI"/>
+            </a:endParaRPr>
           </a:p>
         </p:txBody>
       </p:sp>
     </p:spTree>
     <p:extLst>
       <p:ext uri="{BB962C8B-B14F-4D97-AF65-F5344CB8AC3E}">
-        <p14:creationId xmlns:p14="http://schemas.microsoft.com/office/powerpoint/2010/main" val="1646138950"/>
+        <p14:creationId xmlns:p14="http://schemas.microsoft.com/office/powerpoint/2010/main" val="7168050"/>
       </p:ext>
     </p:extLst>
   </p:cSld>
@@ -7716,7 +7926,7 @@
           <p:cNvPr id="2" name="Title 1">
             <a:extLst>
               <a:ext uri="{FF2B5EF4-FFF2-40B4-BE49-F238E27FC236}">
-                <a16:creationId xmlns:a16="http://schemas.microsoft.com/office/drawing/2014/main" id="{A3F961B8-41D5-4398-A4CE-45B40BCC6500}"/>
+                <a16:creationId xmlns:a16="http://schemas.microsoft.com/office/drawing/2014/main" id="{9416A8C9-9EB6-43DA-BD3E-58FAC144BF5C}"/>
               </a:ext>
             </a:extLst>
           </p:cNvPr>
@@ -7727,14 +7937,94 @@
             <p:ph type="title"/>
           </p:nvPr>
         </p:nvSpPr>
-        <p:spPr/>
+        <p:spPr>
+          <a:xfrm>
+            <a:off x="457199" y="914400"/>
+            <a:ext cx="5605272" cy="1572126"/>
+          </a:xfrm>
+        </p:spPr>
+        <p:txBody>
+          <a:bodyPr anchor="ctr" anchorCtr="0"/>
+          <a:lstStyle/>
+          <a:p>
+            <a:r>
+              <a:rPr lang="en-US" dirty="0"/>
+              <a:t>What is SOE? </a:t>
+            </a:r>
+          </a:p>
+        </p:txBody>
+      </p:sp>
+      <p:sp>
+        <p:nvSpPr>
+          <p:cNvPr id="3" name="Text Placeholder 2">
+            <a:extLst>
+              <a:ext uri="{FF2B5EF4-FFF2-40B4-BE49-F238E27FC236}">
+                <a16:creationId xmlns:a16="http://schemas.microsoft.com/office/drawing/2014/main" id="{50EACE68-C884-4900-BA05-58DEA1511030}"/>
+              </a:ext>
+            </a:extLst>
+          </p:cNvPr>
+          <p:cNvSpPr>
+            <a:spLocks noGrp="1"/>
+          </p:cNvSpPr>
+          <p:nvPr>
+            <p:ph type="body" sz="quarter" idx="14"/>
+          </p:nvPr>
+        </p:nvSpPr>
+        <p:spPr>
+          <a:xfrm>
+            <a:off x="457199" y="2701636"/>
+            <a:ext cx="6226233" cy="3241964"/>
+          </a:xfrm>
+        </p:spPr>
         <p:txBody>
           <a:bodyPr/>
           <a:lstStyle/>
           <a:p>
+            <a:pPr marL="285750" indent="-285750">
+              <a:buFont typeface="Arial" panose="020B0604020202020204" pitchFamily="34" charset="0"/>
+              <a:buChar char="•"/>
+            </a:pPr>
             <a:r>
-              <a:rPr lang="en-NZ" dirty="0"/>
-              <a:t>VIDEO SEO</a:t>
+              <a:rPr lang="en-US" sz="2000" dirty="0"/>
+              <a:t>Stands for SEARCH ENGINE OPTIMISATION</a:t>
+            </a:r>
+          </a:p>
+          <a:p>
+            <a:pPr marL="285750" indent="-285750">
+              <a:buFont typeface="Arial" panose="020B0604020202020204" pitchFamily="34" charset="0"/>
+              <a:buChar char="•"/>
+            </a:pPr>
+            <a:r>
+              <a:rPr lang="en-US" sz="2000" dirty="0"/>
+              <a:t>SEO is the process of affecting the visibility of a website or a web page in a web search engine’s </a:t>
+            </a:r>
+            <a:r>
+              <a:rPr lang="en-US" sz="2000" u="sng" dirty="0"/>
+              <a:t>unpaid</a:t>
+            </a:r>
+            <a:r>
+              <a:rPr lang="en-US" sz="2000" dirty="0"/>
+              <a:t> results.</a:t>
+            </a:r>
+          </a:p>
+          <a:p>
+            <a:pPr marL="285750" indent="-285750">
+              <a:buFont typeface="Arial" panose="020B0604020202020204" pitchFamily="34" charset="0"/>
+              <a:buChar char="•"/>
+            </a:pPr>
+            <a:r>
+              <a:rPr lang="en-US" sz="2000" dirty="0"/>
+              <a:t>SEO helps the engines figure out what each page is about, how it is useful to users.</a:t>
+            </a:r>
+          </a:p>
+          <a:p>
+            <a:pPr marL="285750" indent="-285750">
+              <a:buFont typeface="Arial" panose="020B0604020202020204" pitchFamily="34" charset="0"/>
+              <a:buChar char="•"/>
+            </a:pPr>
+            <a:r>
+              <a:rPr lang="en-US" sz="2000" dirty="0"/>
+              <a:t>SEO allows web developers to provide clues that engines use to understand web content.</a:t>
             </a:r>
           </a:p>
         </p:txBody>
@@ -7742,7 +8032,7 @@
     </p:spTree>
     <p:extLst>
       <p:ext uri="{BB962C8B-B14F-4D97-AF65-F5344CB8AC3E}">
-        <p14:creationId xmlns:p14="http://schemas.microsoft.com/office/powerpoint/2010/main" val="1464997154"/>
+        <p14:creationId xmlns:p14="http://schemas.microsoft.com/office/powerpoint/2010/main" val="1646138950"/>
       </p:ext>
     </p:extLst>
   </p:cSld>
@@ -7774,7 +8064,7 @@
           <p:cNvPr id="2" name="Title 1">
             <a:extLst>
               <a:ext uri="{FF2B5EF4-FFF2-40B4-BE49-F238E27FC236}">
-                <a16:creationId xmlns:a16="http://schemas.microsoft.com/office/drawing/2014/main" id="{9416A8C9-9EB6-43DA-BD3E-58FAC144BF5C}"/>
+                <a16:creationId xmlns:a16="http://schemas.microsoft.com/office/drawing/2014/main" id="{A3F961B8-41D5-4398-A4CE-45B40BCC6500}"/>
               </a:ext>
             </a:extLst>
           </p:cNvPr>
@@ -7785,116 +8075,14 @@
             <p:ph type="title"/>
           </p:nvPr>
         </p:nvSpPr>
-        <p:spPr>
-          <a:xfrm>
-            <a:off x="457199" y="914400"/>
-            <a:ext cx="5605272" cy="1572126"/>
-          </a:xfrm>
-        </p:spPr>
-        <p:txBody>
-          <a:bodyPr anchor="ctr" anchorCtr="0"/>
-          <a:lstStyle/>
-          <a:p>
-            <a:r>
-              <a:rPr lang="en-US" dirty="0"/>
-              <a:t>On Page SOE? </a:t>
-            </a:r>
-          </a:p>
-        </p:txBody>
-      </p:sp>
-      <p:sp>
-        <p:nvSpPr>
-          <p:cNvPr id="3" name="Text Placeholder 2">
-            <a:extLst>
-              <a:ext uri="{FF2B5EF4-FFF2-40B4-BE49-F238E27FC236}">
-                <a16:creationId xmlns:a16="http://schemas.microsoft.com/office/drawing/2014/main" id="{50EACE68-C884-4900-BA05-58DEA1511030}"/>
-              </a:ext>
-            </a:extLst>
-          </p:cNvPr>
-          <p:cNvSpPr>
-            <a:spLocks noGrp="1"/>
-          </p:cNvSpPr>
-          <p:nvPr>
-            <p:ph type="body" sz="quarter" idx="14"/>
-          </p:nvPr>
-        </p:nvSpPr>
-        <p:spPr>
-          <a:xfrm>
-            <a:off x="457199" y="2701636"/>
-            <a:ext cx="6226233" cy="3241964"/>
-          </a:xfrm>
-        </p:spPr>
+        <p:spPr/>
         <p:txBody>
           <a:bodyPr/>
           <a:lstStyle/>
           <a:p>
-            <a:pPr marL="285750" indent="-285750">
-              <a:buFont typeface="Arial" panose="020B0604020202020204" pitchFamily="34" charset="0"/>
-              <a:buChar char="•"/>
-            </a:pPr>
             <a:r>
-              <a:rPr lang="en-US" sz="2000" dirty="0"/>
-              <a:t>Original and relevant content</a:t>
-            </a:r>
-          </a:p>
-          <a:p>
-            <a:pPr marL="285750" indent="-285750">
-              <a:buFont typeface="Arial" panose="020B0604020202020204" pitchFamily="34" charset="0"/>
-              <a:buChar char="•"/>
-            </a:pPr>
-            <a:r>
-              <a:rPr lang="en-US" sz="2000" dirty="0"/>
-              <a:t>Meta tags and Meta Descriptions</a:t>
-            </a:r>
-          </a:p>
-          <a:p>
-            <a:pPr marL="285750" indent="-285750">
-              <a:buFont typeface="Arial" panose="020B0604020202020204" pitchFamily="34" charset="0"/>
-              <a:buChar char="•"/>
-            </a:pPr>
-            <a:r>
-              <a:rPr lang="en-US" sz="2000" dirty="0"/>
-              <a:t>Keyword Density</a:t>
-            </a:r>
-          </a:p>
-          <a:p>
-            <a:pPr marL="285750" indent="-285750">
-              <a:buFont typeface="Arial" panose="020B0604020202020204" pitchFamily="34" charset="0"/>
-              <a:buChar char="•"/>
-            </a:pPr>
-            <a:r>
-              <a:rPr lang="en-US" sz="2000" dirty="0"/>
-              <a:t>Sitemaps</a:t>
-            </a:r>
-          </a:p>
-          <a:p>
-            <a:pPr marL="285750" indent="-285750">
-              <a:buFont typeface="Arial" panose="020B0604020202020204" pitchFamily="34" charset="0"/>
-              <a:buChar char="•"/>
-            </a:pPr>
-            <a:r>
-              <a:rPr lang="en-US" sz="2000" dirty="0"/>
-              <a:t>URL Structure</a:t>
-            </a:r>
-          </a:p>
-          <a:p>
-            <a:pPr marL="285750" indent="-285750">
-              <a:buFont typeface="Arial" panose="020B0604020202020204" pitchFamily="34" charset="0"/>
-              <a:buChar char="•"/>
-            </a:pPr>
-            <a:r>
-              <a:rPr lang="en-US" sz="2000" dirty="0"/>
-              <a:t>Image SEO</a:t>
-            </a:r>
-          </a:p>
-          <a:p>
-            <a:pPr marL="285750" indent="-285750">
-              <a:buFont typeface="Arial" panose="020B0604020202020204" pitchFamily="34" charset="0"/>
-              <a:buChar char="•"/>
-            </a:pPr>
-            <a:r>
-              <a:rPr lang="en-US" sz="2000" dirty="0"/>
-              <a:t>Internal Linking</a:t>
+              <a:rPr lang="en-NZ" dirty="0"/>
+              <a:t>VIDEO SEO</a:t>
             </a:r>
           </a:p>
         </p:txBody>
@@ -7902,157 +8090,7 @@
     </p:spTree>
     <p:extLst>
       <p:ext uri="{BB962C8B-B14F-4D97-AF65-F5344CB8AC3E}">
-        <p14:creationId xmlns:p14="http://schemas.microsoft.com/office/powerpoint/2010/main" val="122353823"/>
-      </p:ext>
-    </p:extLst>
-  </p:cSld>
-  <p:clrMapOvr>
-    <a:masterClrMapping/>
-  </p:clrMapOvr>
-</p:sld>
-</file>
-
-<file path=ppt/slides/slide7.xml><?xml version="1.0" encoding="utf-8"?>
-<p:sld xmlns:a="http://schemas.openxmlformats.org/drawingml/2006/main" xmlns:r="http://schemas.openxmlformats.org/officeDocument/2006/relationships" xmlns:p="http://schemas.openxmlformats.org/presentationml/2006/main">
-  <p:cSld>
-    <p:spTree>
-      <p:nvGrpSpPr>
-        <p:cNvPr id="1" name=""/>
-        <p:cNvGrpSpPr/>
-        <p:nvPr/>
-      </p:nvGrpSpPr>
-      <p:grpSpPr>
-        <a:xfrm>
-          <a:off x="0" y="0"/>
-          <a:ext cx="0" cy="0"/>
-          <a:chOff x="0" y="0"/>
-          <a:chExt cx="0" cy="0"/>
-        </a:xfrm>
-      </p:grpSpPr>
-      <p:sp>
-        <p:nvSpPr>
-          <p:cNvPr id="2" name="Title 1">
-            <a:extLst>
-              <a:ext uri="{FF2B5EF4-FFF2-40B4-BE49-F238E27FC236}">
-                <a16:creationId xmlns:a16="http://schemas.microsoft.com/office/drawing/2014/main" id="{9416A8C9-9EB6-43DA-BD3E-58FAC144BF5C}"/>
-              </a:ext>
-            </a:extLst>
-          </p:cNvPr>
-          <p:cNvSpPr>
-            <a:spLocks noGrp="1"/>
-          </p:cNvSpPr>
-          <p:nvPr>
-            <p:ph type="title"/>
-          </p:nvPr>
-        </p:nvSpPr>
-        <p:spPr>
-          <a:xfrm>
-            <a:off x="457199" y="914400"/>
-            <a:ext cx="5605272" cy="1572126"/>
-          </a:xfrm>
-        </p:spPr>
-        <p:txBody>
-          <a:bodyPr anchor="ctr" anchorCtr="0"/>
-          <a:lstStyle/>
-          <a:p>
-            <a:r>
-              <a:rPr lang="en-US" dirty="0"/>
-              <a:t>OFF Page SOE? </a:t>
-            </a:r>
-          </a:p>
-        </p:txBody>
-      </p:sp>
-      <p:sp>
-        <p:nvSpPr>
-          <p:cNvPr id="3" name="Text Placeholder 2">
-            <a:extLst>
-              <a:ext uri="{FF2B5EF4-FFF2-40B4-BE49-F238E27FC236}">
-                <a16:creationId xmlns:a16="http://schemas.microsoft.com/office/drawing/2014/main" id="{50EACE68-C884-4900-BA05-58DEA1511030}"/>
-              </a:ext>
-            </a:extLst>
-          </p:cNvPr>
-          <p:cNvSpPr>
-            <a:spLocks noGrp="1"/>
-          </p:cNvSpPr>
-          <p:nvPr>
-            <p:ph type="body" sz="quarter" idx="14"/>
-          </p:nvPr>
-        </p:nvSpPr>
-        <p:spPr>
-          <a:xfrm>
-            <a:off x="457199" y="2701636"/>
-            <a:ext cx="6226233" cy="3241964"/>
-          </a:xfrm>
-        </p:spPr>
-        <p:txBody>
-          <a:bodyPr/>
-          <a:lstStyle/>
-          <a:p>
-            <a:pPr marL="285750" indent="-285750">
-              <a:buFont typeface="Arial" panose="020B0604020202020204" pitchFamily="34" charset="0"/>
-              <a:buChar char="•"/>
-            </a:pPr>
-            <a:r>
-              <a:rPr lang="en-US" sz="2000" dirty="0"/>
-              <a:t>Back linking</a:t>
-            </a:r>
-          </a:p>
-          <a:p>
-            <a:pPr marL="285750" indent="-285750">
-              <a:buFont typeface="Arial" panose="020B0604020202020204" pitchFamily="34" charset="0"/>
-              <a:buChar char="•"/>
-            </a:pPr>
-            <a:r>
-              <a:rPr lang="en-US" sz="2000" dirty="0"/>
-              <a:t>Forum posting</a:t>
-            </a:r>
-          </a:p>
-          <a:p>
-            <a:pPr marL="285750" indent="-285750">
-              <a:buFont typeface="Arial" panose="020B0604020202020204" pitchFamily="34" charset="0"/>
-              <a:buChar char="•"/>
-            </a:pPr>
-            <a:r>
-              <a:rPr lang="en-US" sz="2000" dirty="0"/>
-              <a:t>Social bookmarking</a:t>
-            </a:r>
-          </a:p>
-          <a:p>
-            <a:pPr marL="285750" indent="-285750">
-              <a:buFont typeface="Arial" panose="020B0604020202020204" pitchFamily="34" charset="0"/>
-              <a:buChar char="•"/>
-            </a:pPr>
-            <a:r>
-              <a:rPr lang="en-US" sz="2000" dirty="0"/>
-              <a:t>Search Engine Submission</a:t>
-            </a:r>
-          </a:p>
-          <a:p>
-            <a:pPr marL="285750" indent="-285750">
-              <a:buFont typeface="Arial" panose="020B0604020202020204" pitchFamily="34" charset="0"/>
-              <a:buChar char="•"/>
-            </a:pPr>
-            <a:r>
-              <a:rPr lang="en-US" sz="2000" dirty="0"/>
-              <a:t>Link exchange</a:t>
-            </a:r>
-          </a:p>
-          <a:p>
-            <a:pPr marL="285750" indent="-285750">
-              <a:buFont typeface="Arial" panose="020B0604020202020204" pitchFamily="34" charset="0"/>
-              <a:buChar char="•"/>
-            </a:pPr>
-            <a:r>
-              <a:rPr lang="en-US" sz="2000" dirty="0"/>
-              <a:t>Link exchange</a:t>
-            </a:r>
-          </a:p>
-        </p:txBody>
-      </p:sp>
-    </p:spTree>
-    <p:extLst>
-      <p:ext uri="{BB962C8B-B14F-4D97-AF65-F5344CB8AC3E}">
-        <p14:creationId xmlns:p14="http://schemas.microsoft.com/office/powerpoint/2010/main" val="866616894"/>
+        <p14:creationId xmlns:p14="http://schemas.microsoft.com/office/powerpoint/2010/main" val="1464997154"/>
       </p:ext>
     </p:extLst>
   </p:cSld>

</xml_diff>